<commit_message>
rapport f and PPT
</commit_message>
<xml_diff>
--- a/PRESENTATION PFA/Presentatin PFA .pptx
+++ b/PRESENTATION PFA/Presentatin PFA .pptx
@@ -2589,7 +2589,7 @@
           <a:p>
             <a:fld id="{A17392EB-1A60-4B19-91D3-835E6577BF0E}" type="datetimeFigureOut">
               <a:rPr lang="fr-FR" smtClean="0"/>
-              <a:t>26/05/2024</a:t>
+              <a:t>28/05/2024</a:t>
             </a:fld>
             <a:endParaRPr lang="fr-FR"/>
           </a:p>
@@ -2789,7 +2789,7 @@
           <a:p>
             <a:fld id="{A17392EB-1A60-4B19-91D3-835E6577BF0E}" type="datetimeFigureOut">
               <a:rPr lang="fr-FR" smtClean="0"/>
-              <a:t>26/05/2024</a:t>
+              <a:t>28/05/2024</a:t>
             </a:fld>
             <a:endParaRPr lang="fr-FR"/>
           </a:p>
@@ -2999,7 +2999,7 @@
           <a:p>
             <a:fld id="{A17392EB-1A60-4B19-91D3-835E6577BF0E}" type="datetimeFigureOut">
               <a:rPr lang="fr-FR" smtClean="0"/>
-              <a:t>26/05/2024</a:t>
+              <a:t>28/05/2024</a:t>
             </a:fld>
             <a:endParaRPr lang="fr-FR"/>
           </a:p>
@@ -3199,7 +3199,7 @@
           <a:p>
             <a:fld id="{A17392EB-1A60-4B19-91D3-835E6577BF0E}" type="datetimeFigureOut">
               <a:rPr lang="fr-FR" smtClean="0"/>
-              <a:t>26/05/2024</a:t>
+              <a:t>28/05/2024</a:t>
             </a:fld>
             <a:endParaRPr lang="fr-FR"/>
           </a:p>
@@ -3475,7 +3475,7 @@
           <a:p>
             <a:fld id="{A17392EB-1A60-4B19-91D3-835E6577BF0E}" type="datetimeFigureOut">
               <a:rPr lang="fr-FR" smtClean="0"/>
-              <a:t>26/05/2024</a:t>
+              <a:t>28/05/2024</a:t>
             </a:fld>
             <a:endParaRPr lang="fr-FR"/>
           </a:p>
@@ -3743,7 +3743,7 @@
           <a:p>
             <a:fld id="{A17392EB-1A60-4B19-91D3-835E6577BF0E}" type="datetimeFigureOut">
               <a:rPr lang="fr-FR" smtClean="0"/>
-              <a:t>26/05/2024</a:t>
+              <a:t>28/05/2024</a:t>
             </a:fld>
             <a:endParaRPr lang="fr-FR"/>
           </a:p>
@@ -4158,7 +4158,7 @@
           <a:p>
             <a:fld id="{A17392EB-1A60-4B19-91D3-835E6577BF0E}" type="datetimeFigureOut">
               <a:rPr lang="fr-FR" smtClean="0"/>
-              <a:t>26/05/2024</a:t>
+              <a:t>28/05/2024</a:t>
             </a:fld>
             <a:endParaRPr lang="fr-FR"/>
           </a:p>
@@ -4300,7 +4300,7 @@
           <a:p>
             <a:fld id="{A17392EB-1A60-4B19-91D3-835E6577BF0E}" type="datetimeFigureOut">
               <a:rPr lang="fr-FR" smtClean="0"/>
-              <a:t>26/05/2024</a:t>
+              <a:t>28/05/2024</a:t>
             </a:fld>
             <a:endParaRPr lang="fr-FR"/>
           </a:p>
@@ -4413,7 +4413,7 @@
           <a:p>
             <a:fld id="{A17392EB-1A60-4B19-91D3-835E6577BF0E}" type="datetimeFigureOut">
               <a:rPr lang="fr-FR" smtClean="0"/>
-              <a:t>26/05/2024</a:t>
+              <a:t>28/05/2024</a:t>
             </a:fld>
             <a:endParaRPr lang="fr-FR"/>
           </a:p>
@@ -4726,7 +4726,7 @@
           <a:p>
             <a:fld id="{A17392EB-1A60-4B19-91D3-835E6577BF0E}" type="datetimeFigureOut">
               <a:rPr lang="fr-FR" smtClean="0"/>
-              <a:t>26/05/2024</a:t>
+              <a:t>28/05/2024</a:t>
             </a:fld>
             <a:endParaRPr lang="fr-FR"/>
           </a:p>
@@ -5015,7 +5015,7 @@
           <a:p>
             <a:fld id="{A17392EB-1A60-4B19-91D3-835E6577BF0E}" type="datetimeFigureOut">
               <a:rPr lang="fr-FR" smtClean="0"/>
-              <a:t>26/05/2024</a:t>
+              <a:t>28/05/2024</a:t>
             </a:fld>
             <a:endParaRPr lang="fr-FR"/>
           </a:p>
@@ -5258,7 +5258,7 @@
           <a:p>
             <a:fld id="{A17392EB-1A60-4B19-91D3-835E6577BF0E}" type="datetimeFigureOut">
               <a:rPr lang="fr-FR" smtClean="0"/>
-              <a:t>26/05/2024</a:t>
+              <a:t>28/05/2024</a:t>
             </a:fld>
             <a:endParaRPr lang="fr-FR"/>
           </a:p>
@@ -22575,10 +22575,10 @@
       </p:sp>
       <p:pic>
         <p:nvPicPr>
-          <p:cNvPr id="2" name="Picture 1">
-            <a:extLst>
-              <a:ext uri="{FF2B5EF4-FFF2-40B4-BE49-F238E27FC236}">
-                <a16:creationId xmlns:a16="http://schemas.microsoft.com/office/drawing/2014/main" id="{89396846-653B-0598-8203-76EC520566E2}"/>
+          <p:cNvPr id="16" name="Picture 15">
+            <a:extLst>
+              <a:ext uri="{FF2B5EF4-FFF2-40B4-BE49-F238E27FC236}">
+                <a16:creationId xmlns:a16="http://schemas.microsoft.com/office/drawing/2014/main" id="{EAC72FCE-29D0-DAF3-7C11-56E3CAB1E757}"/>
               </a:ext>
             </a:extLst>
           </p:cNvPr>
@@ -22601,8 +22601,8 @@
         </p:blipFill>
         <p:spPr>
           <a:xfrm>
-            <a:off x="1293295" y="1843110"/>
-            <a:ext cx="9461639" cy="4243461"/>
+            <a:off x="1214701" y="1479179"/>
+            <a:ext cx="9762599" cy="4374981"/>
           </a:xfrm>
           <a:prstGeom prst="rect">
             <a:avLst/>
@@ -22662,204 +22662,6 @@
                                         <a:srgbClr val="000000"/>
                                       </p:to>
                                     </p:animClr>
-                                  </p:childTnLst>
-                                </p:cTn>
-                              </p:par>
-                            </p:childTnLst>
-                          </p:cTn>
-                        </p:par>
-                      </p:childTnLst>
-                    </p:cTn>
-                  </p:par>
-                  <p:par>
-                    <p:cTn id="7" fill="hold">
-                      <p:stCondLst>
-                        <p:cond delay="indefinite"/>
-                      </p:stCondLst>
-                      <p:childTnLst>
-                        <p:par>
-                          <p:cTn id="8" fill="hold">
-                            <p:stCondLst>
-                              <p:cond delay="0"/>
-                            </p:stCondLst>
-                            <p:childTnLst>
-                              <p:par>
-                                <p:cTn id="9" presetID="47" presetClass="entr" presetSubtype="0" fill="hold" nodeType="clickEffect">
-                                  <p:stCondLst>
-                                    <p:cond delay="0"/>
-                                  </p:stCondLst>
-                                  <p:childTnLst>
-                                    <p:set>
-                                      <p:cBhvr>
-                                        <p:cTn id="10" dur="1" fill="hold">
-                                          <p:stCondLst>
-                                            <p:cond delay="0"/>
-                                          </p:stCondLst>
-                                        </p:cTn>
-                                        <p:tgtEl>
-                                          <p:spTgt spid="2"/>
-                                        </p:tgtEl>
-                                        <p:attrNameLst>
-                                          <p:attrName>style.visibility</p:attrName>
-                                        </p:attrNameLst>
-                                      </p:cBhvr>
-                                      <p:to>
-                                        <p:strVal val="visible"/>
-                                      </p:to>
-                                    </p:set>
-                                    <p:animEffect transition="in" filter="fade">
-                                      <p:cBhvr>
-                                        <p:cTn id="11" dur="250"/>
-                                        <p:tgtEl>
-                                          <p:spTgt spid="2"/>
-                                        </p:tgtEl>
-                                      </p:cBhvr>
-                                    </p:animEffect>
-                                    <p:anim calcmode="lin" valueType="num">
-                                      <p:cBhvr>
-                                        <p:cTn id="12" dur="250" fill="hold"/>
-                                        <p:tgtEl>
-                                          <p:spTgt spid="2"/>
-                                        </p:tgtEl>
-                                        <p:attrNameLst>
-                                          <p:attrName>ppt_x</p:attrName>
-                                        </p:attrNameLst>
-                                      </p:cBhvr>
-                                      <p:tavLst>
-                                        <p:tav tm="0">
-                                          <p:val>
-                                            <p:strVal val="#ppt_x"/>
-                                          </p:val>
-                                        </p:tav>
-                                        <p:tav tm="100000">
-                                          <p:val>
-                                            <p:strVal val="#ppt_x"/>
-                                          </p:val>
-                                        </p:tav>
-                                      </p:tavLst>
-                                    </p:anim>
-                                    <p:anim calcmode="lin" valueType="num">
-                                      <p:cBhvr>
-                                        <p:cTn id="13" dur="250" fill="hold"/>
-                                        <p:tgtEl>
-                                          <p:spTgt spid="2"/>
-                                        </p:tgtEl>
-                                        <p:attrNameLst>
-                                          <p:attrName>ppt_y</p:attrName>
-                                        </p:attrNameLst>
-                                      </p:cBhvr>
-                                      <p:tavLst>
-                                        <p:tav tm="0">
-                                          <p:val>
-                                            <p:strVal val="#ppt_y-.1"/>
-                                          </p:val>
-                                        </p:tav>
-                                        <p:tav tm="100000">
-                                          <p:val>
-                                            <p:strVal val="#ppt_y"/>
-                                          </p:val>
-                                        </p:tav>
-                                      </p:tavLst>
-                                    </p:anim>
-                                  </p:childTnLst>
-                                </p:cTn>
-                              </p:par>
-                            </p:childTnLst>
-                          </p:cTn>
-                        </p:par>
-                      </p:childTnLst>
-                    </p:cTn>
-                  </p:par>
-                  <p:par>
-                    <p:cTn id="14" fill="hold">
-                      <p:stCondLst>
-                        <p:cond delay="indefinite"/>
-                      </p:stCondLst>
-                      <p:childTnLst>
-                        <p:par>
-                          <p:cTn id="15" fill="hold">
-                            <p:stCondLst>
-                              <p:cond delay="0"/>
-                            </p:stCondLst>
-                            <p:childTnLst>
-                              <p:par>
-                                <p:cTn id="16" presetID="42" presetClass="exit" presetSubtype="0" fill="hold" nodeType="clickEffect">
-                                  <p:stCondLst>
-                                    <p:cond delay="0"/>
-                                  </p:stCondLst>
-                                  <p:childTnLst>
-                                    <p:animEffect transition="out" filter="fade">
-                                      <p:cBhvr>
-                                        <p:cTn id="17" dur="250"/>
-                                        <p:tgtEl>
-                                          <p:spTgt spid="2"/>
-                                        </p:tgtEl>
-                                      </p:cBhvr>
-                                    </p:animEffect>
-                                    <p:anim calcmode="lin" valueType="num">
-                                      <p:cBhvr>
-                                        <p:cTn id="18" dur="250"/>
-                                        <p:tgtEl>
-                                          <p:spTgt spid="2"/>
-                                        </p:tgtEl>
-                                        <p:attrNameLst>
-                                          <p:attrName>ppt_x</p:attrName>
-                                        </p:attrNameLst>
-                                      </p:cBhvr>
-                                      <p:tavLst>
-                                        <p:tav tm="0">
-                                          <p:val>
-                                            <p:strVal val="ppt_x"/>
-                                          </p:val>
-                                        </p:tav>
-                                        <p:tav tm="100000">
-                                          <p:val>
-                                            <p:strVal val="ppt_x"/>
-                                          </p:val>
-                                        </p:tav>
-                                      </p:tavLst>
-                                    </p:anim>
-                                    <p:anim calcmode="lin" valueType="num">
-                                      <p:cBhvr>
-                                        <p:cTn id="19" dur="250"/>
-                                        <p:tgtEl>
-                                          <p:spTgt spid="2"/>
-                                        </p:tgtEl>
-                                        <p:attrNameLst>
-                                          <p:attrName>ppt_y</p:attrName>
-                                        </p:attrNameLst>
-                                      </p:cBhvr>
-                                      <p:tavLst>
-                                        <p:tav tm="0">
-                                          <p:val>
-                                            <p:strVal val="ppt_y"/>
-                                          </p:val>
-                                        </p:tav>
-                                        <p:tav tm="100000">
-                                          <p:val>
-                                            <p:strVal val="ppt_y+.1"/>
-                                          </p:val>
-                                        </p:tav>
-                                      </p:tavLst>
-                                    </p:anim>
-                                    <p:set>
-                                      <p:cBhvr>
-                                        <p:cTn id="20" dur="1" fill="hold">
-                                          <p:stCondLst>
-                                            <p:cond delay="249"/>
-                                          </p:stCondLst>
-                                        </p:cTn>
-                                        <p:tgtEl>
-                                          <p:spTgt spid="2"/>
-                                        </p:tgtEl>
-                                        <p:attrNameLst>
-                                          <p:attrName>style.visibility</p:attrName>
-                                        </p:attrNameLst>
-                                      </p:cBhvr>
-                                      <p:to>
-                                        <p:strVal val="hidden"/>
-                                      </p:to>
-                                    </p:set>
                                   </p:childTnLst>
                                 </p:cTn>
                               </p:par>

</xml_diff>